<commit_message>
Added control statement slides
</commit_message>
<xml_diff>
--- a/architecture_os_and_networking/computer_architecture/HardDrive_006.pptx
+++ b/architecture_os_and_networking/computer_architecture/HardDrive_006.pptx
@@ -303,7 +303,7 @@
           <a:p>
             <a:fld id="{2DBE1460-4DED-4ADC-9935-D740EF273346}" type="datetimeFigureOut">
               <a:rPr lang="en-IE" smtClean="0"/>
-              <a:t>12/10/2013</a:t>
+              <a:t>14/10/2013</a:t>
             </a:fld>
             <a:endParaRPr lang="en-IE"/>
           </a:p>
@@ -473,7 +473,7 @@
           <a:p>
             <a:fld id="{2DBE1460-4DED-4ADC-9935-D740EF273346}" type="datetimeFigureOut">
               <a:rPr lang="en-IE" smtClean="0"/>
-              <a:t>12/10/2013</a:t>
+              <a:t>14/10/2013</a:t>
             </a:fld>
             <a:endParaRPr lang="en-IE"/>
           </a:p>
@@ -653,7 +653,7 @@
           <a:p>
             <a:fld id="{2DBE1460-4DED-4ADC-9935-D740EF273346}" type="datetimeFigureOut">
               <a:rPr lang="en-IE" smtClean="0"/>
-              <a:t>12/10/2013</a:t>
+              <a:t>14/10/2013</a:t>
             </a:fld>
             <a:endParaRPr lang="en-IE"/>
           </a:p>
@@ -823,7 +823,7 @@
           <a:p>
             <a:fld id="{2DBE1460-4DED-4ADC-9935-D740EF273346}" type="datetimeFigureOut">
               <a:rPr lang="en-IE" smtClean="0"/>
-              <a:t>12/10/2013</a:t>
+              <a:t>14/10/2013</a:t>
             </a:fld>
             <a:endParaRPr lang="en-IE"/>
           </a:p>
@@ -1069,7 +1069,7 @@
           <a:p>
             <a:fld id="{2DBE1460-4DED-4ADC-9935-D740EF273346}" type="datetimeFigureOut">
               <a:rPr lang="en-IE" smtClean="0"/>
-              <a:t>12/10/2013</a:t>
+              <a:t>14/10/2013</a:t>
             </a:fld>
             <a:endParaRPr lang="en-IE"/>
           </a:p>
@@ -1357,7 +1357,7 @@
           <a:p>
             <a:fld id="{2DBE1460-4DED-4ADC-9935-D740EF273346}" type="datetimeFigureOut">
               <a:rPr lang="en-IE" smtClean="0"/>
-              <a:t>12/10/2013</a:t>
+              <a:t>14/10/2013</a:t>
             </a:fld>
             <a:endParaRPr lang="en-IE"/>
           </a:p>
@@ -1779,7 +1779,7 @@
           <a:p>
             <a:fld id="{2DBE1460-4DED-4ADC-9935-D740EF273346}" type="datetimeFigureOut">
               <a:rPr lang="en-IE" smtClean="0"/>
-              <a:t>12/10/2013</a:t>
+              <a:t>14/10/2013</a:t>
             </a:fld>
             <a:endParaRPr lang="en-IE"/>
           </a:p>
@@ -1897,7 +1897,7 @@
           <a:p>
             <a:fld id="{2DBE1460-4DED-4ADC-9935-D740EF273346}" type="datetimeFigureOut">
               <a:rPr lang="en-IE" smtClean="0"/>
-              <a:t>12/10/2013</a:t>
+              <a:t>14/10/2013</a:t>
             </a:fld>
             <a:endParaRPr lang="en-IE"/>
           </a:p>
@@ -1992,7 +1992,7 @@
           <a:p>
             <a:fld id="{2DBE1460-4DED-4ADC-9935-D740EF273346}" type="datetimeFigureOut">
               <a:rPr lang="en-IE" smtClean="0"/>
-              <a:t>12/10/2013</a:t>
+              <a:t>14/10/2013</a:t>
             </a:fld>
             <a:endParaRPr lang="en-IE"/>
           </a:p>
@@ -2269,7 +2269,7 @@
           <a:p>
             <a:fld id="{2DBE1460-4DED-4ADC-9935-D740EF273346}" type="datetimeFigureOut">
               <a:rPr lang="en-IE" smtClean="0"/>
-              <a:t>12/10/2013</a:t>
+              <a:t>14/10/2013</a:t>
             </a:fld>
             <a:endParaRPr lang="en-IE"/>
           </a:p>
@@ -2522,7 +2522,7 @@
           <a:p>
             <a:fld id="{2DBE1460-4DED-4ADC-9935-D740EF273346}" type="datetimeFigureOut">
               <a:rPr lang="en-IE" smtClean="0"/>
-              <a:t>12/10/2013</a:t>
+              <a:t>14/10/2013</a:t>
             </a:fld>
             <a:endParaRPr lang="en-IE"/>
           </a:p>
@@ -2735,7 +2735,7 @@
           <a:p>
             <a:fld id="{2DBE1460-4DED-4ADC-9935-D740EF273346}" type="datetimeFigureOut">
               <a:rPr lang="en-IE" smtClean="0"/>
-              <a:t>12/10/2013</a:t>
+              <a:t>14/10/2013</a:t>
             </a:fld>
             <a:endParaRPr lang="en-IE"/>
           </a:p>
@@ -3126,8 +3126,8 @@
           <a:lstStyle/>
           <a:p>
             <a:r>
-              <a:rPr lang="en-IE" dirty="0" err="1" smtClean="0"/>
-              <a:t>HardDrive</a:t>
+              <a:rPr lang="en-IE" dirty="0" smtClean="0"/>
+              <a:t>Hard Drive</a:t>
             </a:r>
             <a:endParaRPr lang="en-IE" dirty="0"/>
           </a:p>

</xml_diff>